<commit_message>
fixed ppt appendix error
</commit_message>
<xml_diff>
--- a/BikeSharingAnalysis.pptx
+++ b/BikeSharingAnalysis.pptx
@@ -132,8 +132,9 @@
 <file path=ppt/revisionInfo.xml><?xml version="1.0" encoding="utf-8"?>
 <p1510:revInfo xmlns:a="http://schemas.openxmlformats.org/drawingml/2006/main" xmlns:r="http://schemas.openxmlformats.org/officeDocument/2006/relationships" xmlns:p1510="http://schemas.microsoft.com/office/powerpoint/2015/10/main">
   <p1510:revLst>
-    <p1510:client id="{071395FD-A4AD-3F12-449D-F207AE88BD04}" v="1854" dt="2024-04-12T11:00:17.163"/>
+    <p1510:client id="{071395FD-A4AD-3F12-449D-F207AE88BD04}" v="1883" dt="2024-04-12T12:32:01.959"/>
     <p1510:client id="{2BE72CFB-7E7F-9936-6A0F-200A210DCE58}" v="83" dt="2024-04-11T10:14:21.657"/>
+    <p1510:client id="{AC87EBF2-DD38-E69D-675F-075F8608FF12}" v="1" dt="2024-04-12T13:27:59.705"/>
     <p1510:client id="{E3377498-80FC-8B1F-8044-8539EA1A1944}" v="608" dt="2024-04-11T11:06:20.831"/>
   </p1510:revLst>
 </p1510:revInfo>
@@ -5269,11 +5270,15 @@
               <a:buChar char="•"/>
             </a:pPr>
             <a:r>
+              <a:rPr lang="en-US"/>
+              <a:t>Hour, temperature and humidity seem to have a </a:t>
+            </a:r>
+            <a:r>
               <a:rPr lang="en-US" dirty="0"/>
-              <a:t>Hour and humidity seem to have a moderate relationship with </a:t>
-            </a:r>
-            <a:r>
-              <a:rPr lang="en-US" err="1"/>
+              <a:t>moderate relationship with </a:t>
+            </a:r>
+            <a:r>
+              <a:rPr lang="en-US" dirty="0" err="1"/>
               <a:t>cnt</a:t>
             </a:r>
             <a:r>
@@ -6742,156 +6747,6 @@
       </p:sp>
       <p:pic>
         <p:nvPicPr>
-          <p:cNvPr id="2" name="Picture 1">
-            <a:extLst>
-              <a:ext uri="{FF2B5EF4-FFF2-40B4-BE49-F238E27FC236}">
-                <a16:creationId xmlns:a16="http://schemas.microsoft.com/office/drawing/2014/main" id="{078B865E-75E7-FE11-D426-24E59C39FDA3}"/>
-              </a:ext>
-            </a:extLst>
-          </p:cNvPr>
-          <p:cNvPicPr>
-            <a:picLocks noChangeAspect="1"/>
-          </p:cNvPicPr>
-          <p:nvPr/>
-        </p:nvPicPr>
-        <p:blipFill>
-          <a:blip r:embed="rId2"/>
-          <a:stretch>
-            <a:fillRect/>
-          </a:stretch>
-        </p:blipFill>
-        <p:spPr>
-          <a:xfrm>
-            <a:off x="3048000" y="1731818"/>
-            <a:ext cx="6096000" cy="3394364"/>
-          </a:xfrm>
-          <a:prstGeom prst="rect">
-            <a:avLst/>
-          </a:prstGeom>
-        </p:spPr>
-      </p:pic>
-      <p:pic>
-        <p:nvPicPr>
-          <p:cNvPr id="4" name="Picture 3">
-            <a:extLst>
-              <a:ext uri="{FF2B5EF4-FFF2-40B4-BE49-F238E27FC236}">
-                <a16:creationId xmlns:a16="http://schemas.microsoft.com/office/drawing/2014/main" id="{15C1DDA4-7B8B-EF9B-D40B-C5765BDBB429}"/>
-              </a:ext>
-            </a:extLst>
-          </p:cNvPr>
-          <p:cNvPicPr>
-            <a:picLocks noChangeAspect="1"/>
-          </p:cNvPicPr>
-          <p:nvPr/>
-        </p:nvPicPr>
-        <p:blipFill>
-          <a:blip r:embed="rId3"/>
-          <a:stretch>
-            <a:fillRect/>
-          </a:stretch>
-        </p:blipFill>
-        <p:spPr>
-          <a:xfrm>
-            <a:off x="3238500" y="1922318"/>
-            <a:ext cx="6096000" cy="3394364"/>
-          </a:xfrm>
-          <a:prstGeom prst="rect">
-            <a:avLst/>
-          </a:prstGeom>
-        </p:spPr>
-      </p:pic>
-      <p:pic>
-        <p:nvPicPr>
-          <p:cNvPr id="6" name="Picture 5" descr="A graph of blue and green bars&#10;&#10;Description automatically generated">
-            <a:extLst>
-              <a:ext uri="{FF2B5EF4-FFF2-40B4-BE49-F238E27FC236}">
-                <a16:creationId xmlns:a16="http://schemas.microsoft.com/office/drawing/2014/main" id="{2065B88B-BE16-4D3A-4FA9-E5D57829F22C}"/>
-              </a:ext>
-            </a:extLst>
-          </p:cNvPr>
-          <p:cNvPicPr>
-            <a:picLocks noChangeAspect="1"/>
-          </p:cNvPicPr>
-          <p:nvPr/>
-        </p:nvPicPr>
-        <p:blipFill>
-          <a:blip r:embed="rId4"/>
-          <a:stretch>
-            <a:fillRect/>
-          </a:stretch>
-        </p:blipFill>
-        <p:spPr>
-          <a:xfrm>
-            <a:off x="1528704" y="1745929"/>
-            <a:ext cx="5629275" cy="2647950"/>
-          </a:xfrm>
-          <a:prstGeom prst="rect">
-            <a:avLst/>
-          </a:prstGeom>
-        </p:spPr>
-      </p:pic>
-      <p:pic>
-        <p:nvPicPr>
-          <p:cNvPr id="7" name="Picture 6" descr="A graph of blue and green bars&#10;&#10;Description automatically generated">
-            <a:extLst>
-              <a:ext uri="{FF2B5EF4-FFF2-40B4-BE49-F238E27FC236}">
-                <a16:creationId xmlns:a16="http://schemas.microsoft.com/office/drawing/2014/main" id="{788AD41E-D036-5125-08D6-35F49CDC1879}"/>
-              </a:ext>
-            </a:extLst>
-          </p:cNvPr>
-          <p:cNvPicPr>
-            <a:picLocks noChangeAspect="1"/>
-          </p:cNvPicPr>
-          <p:nvPr/>
-        </p:nvPicPr>
-        <p:blipFill>
-          <a:blip r:embed="rId5"/>
-          <a:stretch>
-            <a:fillRect/>
-          </a:stretch>
-        </p:blipFill>
-        <p:spPr>
-          <a:xfrm>
-            <a:off x="2156648" y="2293911"/>
-            <a:ext cx="5629275" cy="2647950"/>
-          </a:xfrm>
-          <a:prstGeom prst="rect">
-            <a:avLst/>
-          </a:prstGeom>
-        </p:spPr>
-      </p:pic>
-      <p:pic>
-        <p:nvPicPr>
-          <p:cNvPr id="8" name="Picture 7" descr="A graph of blue and green bars&#10;&#10;Description automatically generated">
-            <a:extLst>
-              <a:ext uri="{FF2B5EF4-FFF2-40B4-BE49-F238E27FC236}">
-                <a16:creationId xmlns:a16="http://schemas.microsoft.com/office/drawing/2014/main" id="{1872E50F-F475-149E-B48C-9E85219C49A2}"/>
-              </a:ext>
-            </a:extLst>
-          </p:cNvPr>
-          <p:cNvPicPr>
-            <a:picLocks noChangeAspect="1"/>
-          </p:cNvPicPr>
-          <p:nvPr/>
-        </p:nvPicPr>
-        <p:blipFill>
-          <a:blip r:embed="rId6"/>
-          <a:stretch>
-            <a:fillRect/>
-          </a:stretch>
-        </p:blipFill>
-        <p:spPr>
-          <a:xfrm>
-            <a:off x="2050815" y="3994299"/>
-            <a:ext cx="5629275" cy="2647950"/>
-          </a:xfrm>
-          <a:prstGeom prst="rect">
-            <a:avLst/>
-          </a:prstGeom>
-        </p:spPr>
-      </p:pic>
-      <p:pic>
-        <p:nvPicPr>
           <p:cNvPr id="9" name="Picture 8">
             <a:extLst>
               <a:ext uri="{FF2B5EF4-FFF2-40B4-BE49-F238E27FC236}">
@@ -6905,7 +6760,7 @@
           <p:nvPr/>
         </p:nvPicPr>
         <p:blipFill>
-          <a:blip r:embed="rId7"/>
+          <a:blip r:embed="rId2"/>
           <a:stretch>
             <a:fillRect/>
           </a:stretch>
@@ -6935,14 +6790,14 @@
           <p:nvPr/>
         </p:nvPicPr>
         <p:blipFill>
-          <a:blip r:embed="rId8"/>
+          <a:blip r:embed="rId3"/>
           <a:stretch>
             <a:fillRect/>
           </a:stretch>
         </p:blipFill>
         <p:spPr>
           <a:xfrm>
-            <a:off x="7008519" y="1887040"/>
+            <a:off x="7008519" y="2987707"/>
             <a:ext cx="4867275" cy="3067050"/>
           </a:xfrm>
           <a:prstGeom prst="rect">
@@ -6965,14 +6820,14 @@
           <p:nvPr/>
         </p:nvPicPr>
         <p:blipFill>
-          <a:blip r:embed="rId9"/>
+          <a:blip r:embed="rId4"/>
           <a:stretch>
             <a:fillRect/>
           </a:stretch>
         </p:blipFill>
         <p:spPr>
           <a:xfrm>
-            <a:off x="6813315" y="3784985"/>
+            <a:off x="1230019" y="1715355"/>
             <a:ext cx="4867275" cy="3057525"/>
           </a:xfrm>
           <a:prstGeom prst="rect">
@@ -6980,431 +6835,6 @@
           </a:prstGeom>
         </p:spPr>
       </p:pic>
-      <p:sp>
-        <p:nvSpPr>
-          <p:cNvPr id="13" name="Content Placeholder 12">
-            <a:extLst>
-              <a:ext uri="{FF2B5EF4-FFF2-40B4-BE49-F238E27FC236}">
-                <a16:creationId xmlns:a16="http://schemas.microsoft.com/office/drawing/2014/main" id="{3B4189F5-CE00-352C-5B81-2ACEFC7A7C8A}"/>
-              </a:ext>
-            </a:extLst>
-          </p:cNvPr>
-          <p:cNvSpPr>
-            <a:spLocks noGrp="1"/>
-          </p:cNvSpPr>
-          <p:nvPr>
-            <p:ph idx="1"/>
-          </p:nvPr>
-        </p:nvSpPr>
-        <p:spPr/>
-        <p:txBody>
-          <a:bodyPr/>
-          <a:lstStyle/>
-          <a:p>
-            <a:endParaRPr lang="en-US"/>
-          </a:p>
-        </p:txBody>
-      </p:sp>
-      <p:sp>
-        <p:nvSpPr>
-          <p:cNvPr id="14" name="Content Placeholder 2">
-            <a:extLst>
-              <a:ext uri="{FF2B5EF4-FFF2-40B4-BE49-F238E27FC236}">
-                <a16:creationId xmlns:a16="http://schemas.microsoft.com/office/drawing/2014/main" id="{A644FDA6-7FC7-A9FF-D47F-5448A74A5577}"/>
-              </a:ext>
-            </a:extLst>
-          </p:cNvPr>
-          <p:cNvSpPr>
-            <a:spLocks noGrp="1"/>
-          </p:cNvSpPr>
-          <p:nvPr/>
-        </p:nvSpPr>
-        <p:spPr>
-          <a:xfrm>
-            <a:off x="995304" y="4736630"/>
-            <a:ext cx="4271904" cy="1906883"/>
-          </a:xfrm>
-          <a:prstGeom prst="rect">
-            <a:avLst/>
-          </a:prstGeom>
-        </p:spPr>
-        <p:txBody>
-          <a:bodyPr vert="horz" lIns="91440" tIns="45720" rIns="91440" bIns="45720" rtlCol="0" anchor="t">
-            <a:normAutofit/>
-          </a:bodyPr>
-          <a:lstStyle>
-            <a:lvl1pPr marL="384048" indent="-384048" algn="l" defTabSz="914400" rtl="0" eaLnBrk="1" latinLnBrk="0" hangingPunct="1">
-              <a:lnSpc>
-                <a:spcPct val="94000"/>
-              </a:lnSpc>
-              <a:spcBef>
-                <a:spcPts val="1000"/>
-              </a:spcBef>
-              <a:spcAft>
-                <a:spcPts val="200"/>
-              </a:spcAft>
-              <a:buFont typeface="Franklin Gothic Book" panose="020B0503020102020204" pitchFamily="34" charset="0"/>
-              <a:buChar char="■"/>
-              <a:defRPr sz="2000" kern="1200" baseline="0">
-                <a:solidFill>
-                  <a:schemeClr val="tx2"/>
-                </a:solidFill>
-                <a:latin typeface="+mn-lt"/>
-                <a:ea typeface="+mn-ea"/>
-                <a:cs typeface="+mn-cs"/>
-              </a:defRPr>
-            </a:lvl1pPr>
-            <a:lvl2pPr marL="914400" indent="-384048" algn="l" defTabSz="914400" rtl="0" eaLnBrk="1" latinLnBrk="0" hangingPunct="1">
-              <a:lnSpc>
-                <a:spcPct val="94000"/>
-              </a:lnSpc>
-              <a:spcBef>
-                <a:spcPts val="500"/>
-              </a:spcBef>
-              <a:spcAft>
-                <a:spcPts val="200"/>
-              </a:spcAft>
-              <a:buFont typeface="Franklin Gothic Book" panose="020B0503020102020204" pitchFamily="34" charset="0"/>
-              <a:buChar char="–"/>
-              <a:defRPr sz="2000" i="1" kern="1200" baseline="0">
-                <a:solidFill>
-                  <a:schemeClr val="tx2"/>
-                </a:solidFill>
-                <a:latin typeface="+mn-lt"/>
-                <a:ea typeface="+mn-ea"/>
-                <a:cs typeface="+mn-cs"/>
-              </a:defRPr>
-            </a:lvl2pPr>
-            <a:lvl3pPr marL="1371600" indent="-384048" algn="l" defTabSz="914400" rtl="0" eaLnBrk="1" latinLnBrk="0" hangingPunct="1">
-              <a:lnSpc>
-                <a:spcPct val="94000"/>
-              </a:lnSpc>
-              <a:spcBef>
-                <a:spcPts val="500"/>
-              </a:spcBef>
-              <a:spcAft>
-                <a:spcPts val="200"/>
-              </a:spcAft>
-              <a:buFont typeface="Franklin Gothic Book" panose="020B0503020102020204" pitchFamily="34" charset="0"/>
-              <a:buChar char="■"/>
-              <a:defRPr sz="1800" kern="1200" baseline="0">
-                <a:solidFill>
-                  <a:schemeClr val="tx2"/>
-                </a:solidFill>
-                <a:latin typeface="+mn-lt"/>
-                <a:ea typeface="+mn-ea"/>
-                <a:cs typeface="+mn-cs"/>
-              </a:defRPr>
-            </a:lvl3pPr>
-            <a:lvl4pPr marL="1828800" indent="-384048" algn="l" defTabSz="914400" rtl="0" eaLnBrk="1" latinLnBrk="0" hangingPunct="1">
-              <a:lnSpc>
-                <a:spcPct val="94000"/>
-              </a:lnSpc>
-              <a:spcBef>
-                <a:spcPts val="500"/>
-              </a:spcBef>
-              <a:spcAft>
-                <a:spcPts val="200"/>
-              </a:spcAft>
-              <a:buFont typeface="Franklin Gothic Book" panose="020B0503020102020204" pitchFamily="34" charset="0"/>
-              <a:buChar char="–"/>
-              <a:defRPr sz="1800" i="1" kern="1200" baseline="0">
-                <a:solidFill>
-                  <a:schemeClr val="tx2"/>
-                </a:solidFill>
-                <a:latin typeface="+mn-lt"/>
-                <a:ea typeface="+mn-ea"/>
-                <a:cs typeface="+mn-cs"/>
-              </a:defRPr>
-            </a:lvl4pPr>
-            <a:lvl5pPr marL="2286000" indent="-384048" algn="l" defTabSz="914400" rtl="0" eaLnBrk="1" latinLnBrk="0" hangingPunct="1">
-              <a:lnSpc>
-                <a:spcPct val="94000"/>
-              </a:lnSpc>
-              <a:spcBef>
-                <a:spcPts val="500"/>
-              </a:spcBef>
-              <a:spcAft>
-                <a:spcPts val="200"/>
-              </a:spcAft>
-              <a:buFont typeface="Franklin Gothic Book" panose="020B0503020102020204" pitchFamily="34" charset="0"/>
-              <a:buChar char="■"/>
-              <a:defRPr sz="1600" kern="1200" baseline="0">
-                <a:solidFill>
-                  <a:schemeClr val="tx2"/>
-                </a:solidFill>
-                <a:latin typeface="+mn-lt"/>
-                <a:ea typeface="+mn-ea"/>
-                <a:cs typeface="+mn-cs"/>
-              </a:defRPr>
-            </a:lvl5pPr>
-            <a:lvl6pPr marL="2743200" indent="-384048" algn="l" defTabSz="914400" rtl="0" eaLnBrk="1" latinLnBrk="0" hangingPunct="1">
-              <a:lnSpc>
-                <a:spcPct val="94000"/>
-              </a:lnSpc>
-              <a:spcBef>
-                <a:spcPts val="500"/>
-              </a:spcBef>
-              <a:spcAft>
-                <a:spcPts val="200"/>
-              </a:spcAft>
-              <a:buFont typeface="Franklin Gothic Book" panose="020B0503020102020204" pitchFamily="34" charset="0"/>
-              <a:buChar char="–"/>
-              <a:defRPr sz="1600" i="1" kern="1200" baseline="0">
-                <a:solidFill>
-                  <a:schemeClr val="tx2"/>
-                </a:solidFill>
-                <a:latin typeface="+mn-lt"/>
-                <a:ea typeface="+mn-ea"/>
-                <a:cs typeface="+mn-cs"/>
-              </a:defRPr>
-            </a:lvl6pPr>
-            <a:lvl7pPr marL="3200400" indent="-384048" algn="l" defTabSz="914400" rtl="0" eaLnBrk="1" latinLnBrk="0" hangingPunct="1">
-              <a:lnSpc>
-                <a:spcPct val="94000"/>
-              </a:lnSpc>
-              <a:spcBef>
-                <a:spcPts val="500"/>
-              </a:spcBef>
-              <a:spcAft>
-                <a:spcPts val="200"/>
-              </a:spcAft>
-              <a:buFont typeface="Franklin Gothic Book" panose="020B0503020102020204" pitchFamily="34" charset="0"/>
-              <a:buChar char="■"/>
-              <a:defRPr sz="1400" kern="1200" baseline="0">
-                <a:solidFill>
-                  <a:schemeClr val="tx2"/>
-                </a:solidFill>
-                <a:latin typeface="+mn-lt"/>
-                <a:ea typeface="+mn-ea"/>
-                <a:cs typeface="+mn-cs"/>
-              </a:defRPr>
-            </a:lvl7pPr>
-            <a:lvl8pPr marL="3657600" indent="-384048" algn="l" defTabSz="914400" rtl="0" eaLnBrk="1" latinLnBrk="0" hangingPunct="1">
-              <a:lnSpc>
-                <a:spcPct val="94000"/>
-              </a:lnSpc>
-              <a:spcBef>
-                <a:spcPts val="500"/>
-              </a:spcBef>
-              <a:spcAft>
-                <a:spcPts val="200"/>
-              </a:spcAft>
-              <a:buFont typeface="Franklin Gothic Book" panose="020B0503020102020204" pitchFamily="34" charset="0"/>
-              <a:buChar char="–"/>
-              <a:defRPr sz="1400" i="1" kern="1200" baseline="0">
-                <a:solidFill>
-                  <a:schemeClr val="tx2"/>
-                </a:solidFill>
-                <a:latin typeface="+mn-lt"/>
-                <a:ea typeface="+mn-ea"/>
-                <a:cs typeface="+mn-cs"/>
-              </a:defRPr>
-            </a:lvl8pPr>
-            <a:lvl9pPr marL="4114800" indent="-384048" algn="l" defTabSz="914400" rtl="0" eaLnBrk="1" latinLnBrk="0" hangingPunct="1">
-              <a:lnSpc>
-                <a:spcPct val="94000"/>
-              </a:lnSpc>
-              <a:spcBef>
-                <a:spcPts val="500"/>
-              </a:spcBef>
-              <a:spcAft>
-                <a:spcPts val="200"/>
-              </a:spcAft>
-              <a:buFont typeface="Franklin Gothic Book" panose="020B0503020102020204" pitchFamily="34" charset="0"/>
-              <a:buChar char="■"/>
-              <a:defRPr sz="1400" kern="1200" baseline="0">
-                <a:solidFill>
-                  <a:schemeClr val="tx2"/>
-                </a:solidFill>
-                <a:latin typeface="+mn-lt"/>
-                <a:ea typeface="+mn-ea"/>
-                <a:cs typeface="+mn-cs"/>
-              </a:defRPr>
-            </a:lvl9pPr>
-          </a:lstStyle>
-          <a:p>
-            <a:pPr marL="383540" indent="-383540"/>
-            <a:r>
-              <a:rPr lang="en-GB" dirty="0"/>
-              <a:t>K-</a:t>
-            </a:r>
-            <a:r>
-              <a:rPr lang="en-GB" dirty="0" err="1"/>
-              <a:t>nn</a:t>
-            </a:r>
-          </a:p>
-          <a:p>
-            <a:pPr lvl="1" indent="-383540">
-              <a:buFont typeface="Courier New" panose="020B0503020102020204" pitchFamily="34" charset="0"/>
-              <a:buChar char="o"/>
-            </a:pPr>
-            <a:r>
-              <a:rPr lang="en-GB" sz="1100" dirty="0">
-                <a:solidFill>
-                  <a:srgbClr val="000000"/>
-                </a:solidFill>
-                <a:ea typeface="+mn-lt"/>
-                <a:cs typeface="+mn-lt"/>
-              </a:rPr>
-              <a:t>Best Hyperparameters: {'</a:t>
-            </a:r>
-            <a:r>
-              <a:rPr lang="en-GB" sz="1100" dirty="0" err="1">
-                <a:solidFill>
-                  <a:srgbClr val="000000"/>
-                </a:solidFill>
-                <a:ea typeface="+mn-lt"/>
-                <a:cs typeface="+mn-lt"/>
-              </a:rPr>
-              <a:t>n_neighbors</a:t>
-            </a:r>
-            <a:r>
-              <a:rPr lang="en-GB" sz="1100" dirty="0">
-                <a:solidFill>
-                  <a:srgbClr val="000000"/>
-                </a:solidFill>
-                <a:ea typeface="+mn-lt"/>
-                <a:cs typeface="+mn-lt"/>
-              </a:rPr>
-              <a:t>': 7, 'p': 1}</a:t>
-            </a:r>
-            <a:endParaRPr lang="en-GB" i="0" dirty="0">
-              <a:solidFill>
-                <a:srgbClr val="191B0E"/>
-              </a:solidFill>
-              <a:ea typeface="+mn-lt"/>
-              <a:cs typeface="+mn-lt"/>
-            </a:endParaRPr>
-          </a:p>
-          <a:p>
-            <a:pPr lvl="1" indent="-383540">
-              <a:buFont typeface="Courier New" panose="020B0503020102020204" pitchFamily="34" charset="0"/>
-              <a:buChar char="o"/>
-            </a:pPr>
-            <a:r>
-              <a:rPr lang="en-GB" sz="1100" dirty="0">
-                <a:solidFill>
-                  <a:srgbClr val="000000"/>
-                </a:solidFill>
-                <a:ea typeface="+mn-lt"/>
-                <a:cs typeface="+mn-lt"/>
-              </a:rPr>
-              <a:t>KNN (</a:t>
-            </a:r>
-            <a:r>
-              <a:rPr lang="en-GB" sz="1100" dirty="0" err="1">
-                <a:solidFill>
-                  <a:srgbClr val="000000"/>
-                </a:solidFill>
-                <a:ea typeface="+mn-lt"/>
-                <a:cs typeface="+mn-lt"/>
-              </a:rPr>
-              <a:t>GridSearchCV</a:t>
-            </a:r>
-            <a:r>
-              <a:rPr lang="en-GB" sz="1100" dirty="0">
-                <a:solidFill>
-                  <a:srgbClr val="000000"/>
-                </a:solidFill>
-                <a:ea typeface="+mn-lt"/>
-                <a:cs typeface="+mn-lt"/>
-              </a:rPr>
-              <a:t>) MAE: 437</a:t>
-            </a:r>
-            <a:endParaRPr lang="en-GB" i="0" dirty="0">
-              <a:solidFill>
-                <a:srgbClr val="191B0E"/>
-              </a:solidFill>
-              <a:ea typeface="+mn-lt"/>
-              <a:cs typeface="+mn-lt"/>
-            </a:endParaRPr>
-          </a:p>
-          <a:p>
-            <a:pPr lvl="1" indent="-383540">
-              <a:buFont typeface="Courier New" panose="020B0503020102020204" pitchFamily="34" charset="0"/>
-              <a:buChar char="o"/>
-            </a:pPr>
-            <a:r>
-              <a:rPr lang="en-GB" sz="1100" dirty="0">
-                <a:solidFill>
-                  <a:srgbClr val="000000"/>
-                </a:solidFill>
-                <a:ea typeface="+mn-lt"/>
-                <a:cs typeface="+mn-lt"/>
-              </a:rPr>
-              <a:t>KNN (</a:t>
-            </a:r>
-            <a:r>
-              <a:rPr lang="en-GB" sz="1100" err="1">
-                <a:solidFill>
-                  <a:srgbClr val="000000"/>
-                </a:solidFill>
-                <a:ea typeface="+mn-lt"/>
-                <a:cs typeface="+mn-lt"/>
-              </a:rPr>
-              <a:t>GridSearchCV</a:t>
-            </a:r>
-            <a:r>
-              <a:rPr lang="en-GB" sz="1100">
-                <a:solidFill>
-                  <a:srgbClr val="000000"/>
-                </a:solidFill>
-                <a:ea typeface="+mn-lt"/>
-                <a:cs typeface="+mn-lt"/>
-              </a:rPr>
-              <a:t>) MSE: 465697</a:t>
-            </a:r>
-            <a:endParaRPr lang="en-GB" i="0">
-              <a:solidFill>
-                <a:srgbClr val="191B0E"/>
-              </a:solidFill>
-              <a:ea typeface="+mn-lt"/>
-              <a:cs typeface="+mn-lt"/>
-            </a:endParaRPr>
-          </a:p>
-          <a:p>
-            <a:pPr lvl="1" indent="-383540">
-              <a:buFont typeface="Courier New" panose="020B0503020102020204" pitchFamily="34" charset="0"/>
-              <a:buChar char="o"/>
-            </a:pPr>
-            <a:r>
-              <a:rPr lang="en-GB" sz="1100" dirty="0">
-                <a:solidFill>
-                  <a:srgbClr val="000000"/>
-                </a:solidFill>
-                <a:ea typeface="+mn-lt"/>
-                <a:cs typeface="+mn-lt"/>
-              </a:rPr>
-              <a:t>Mean Squared Error: 465697</a:t>
-            </a:r>
-            <a:endParaRPr lang="en-GB" i="0" dirty="0">
-              <a:solidFill>
-                <a:srgbClr val="191B0E"/>
-              </a:solidFill>
-              <a:ea typeface="+mn-lt"/>
-              <a:cs typeface="+mn-lt"/>
-            </a:endParaRPr>
-          </a:p>
-          <a:p>
-            <a:pPr lvl="1" indent="-383540">
-              <a:buFont typeface="Courier New" panose="020B0503020102020204" pitchFamily="34" charset="0"/>
-              <a:buChar char="o"/>
-            </a:pPr>
-            <a:r>
-              <a:rPr lang="en-GB" sz="1100" dirty="0">
-                <a:solidFill>
-                  <a:srgbClr val="000000"/>
-                </a:solidFill>
-                <a:ea typeface="+mn-lt"/>
-                <a:cs typeface="+mn-lt"/>
-              </a:rPr>
-              <a:t>R-squared Score: 0.57</a:t>
-            </a:r>
-            <a:endParaRPr lang="en-GB" i="0" dirty="0"/>
-          </a:p>
-        </p:txBody>
-      </p:sp>
     </p:spTree>
     <p:extLst>
       <p:ext uri="{BB962C8B-B14F-4D97-AF65-F5344CB8AC3E}">

</xml_diff>